<commit_message>
Preliminary routing of LAN IC A
- Removed duplicate pull-up resistors on the MII interface between LAN ICs A and B (on pages 5 and 7)
- Centralized pull-up resistors on the MII interface signals to page 3 (ECAT SWITCH) to improve readability
- Removed switches used to configure TX shift timings for LAN ICs A and B
- Tentative routing and component placements for LAN IC A
- Reduced board length from 100mm to 85mm
- Added the project integrated library (H4_6-port_EtherCAT_Junction_Module) to git
- Added projects LOGs and Outputs to gitignore
</commit_message>
<xml_diff>
--- a/Documentation/Ref.pptx
+++ b/Documentation/Ref.pptx
@@ -8,6 +8,9 @@
     <p:sldId id="256" r:id="rId2"/>
     <p:sldId id="257" r:id="rId3"/>
     <p:sldId id="258" r:id="rId4"/>
+    <p:sldId id="259" r:id="rId5"/>
+    <p:sldId id="260" r:id="rId6"/>
+    <p:sldId id="261" r:id="rId7"/>
   </p:sldIdLst>
   <p:sldSz cx="12192000" cy="6858000"/>
   <p:notesSz cx="6858000" cy="9144000"/>
@@ -106,6 +109,11 @@
       </a:defRPr>
     </a:lvl9pPr>
   </p:defaultTextStyle>
+  <p:extLst>
+    <p:ext uri="{EFAFB233-063F-42B5-8137-9DF3F51BA10A}">
+      <p15:sldGuideLst xmlns:p15="http://schemas.microsoft.com/office/powerpoint/2012/main"/>
+    </p:ext>
+  </p:extLst>
 </p:presentation>
 </file>
 
@@ -151,7 +159,7 @@
           </a:lstStyle>
           <a:p>
             <a:r>
-              <a:rPr lang="en-US" smtClean="0"/>
+              <a:rPr lang="en-US"/>
               <a:t>Click to edit Master title style</a:t>
             </a:r>
             <a:endParaRPr lang="en-CA"/>
@@ -216,7 +224,7 @@
           </a:lstStyle>
           <a:p>
             <a:r>
-              <a:rPr lang="en-US" smtClean="0"/>
+              <a:rPr lang="en-US"/>
               <a:t>Click to edit Master subtitle style</a:t>
             </a:r>
             <a:endParaRPr lang="en-CA"/>
@@ -240,7 +248,7 @@
           <a:p>
             <a:fld id="{C81834C4-83DE-442D-8864-6FB21BA191F9}" type="datetimeFigureOut">
               <a:rPr lang="en-CA" smtClean="0"/>
-              <a:t>2023-05-12</a:t>
+              <a:t>2023-06-21</a:t>
             </a:fld>
             <a:endParaRPr lang="en-CA"/>
           </a:p>
@@ -334,7 +342,7 @@
           <a:lstStyle/>
           <a:p>
             <a:r>
-              <a:rPr lang="en-US" smtClean="0"/>
+              <a:rPr lang="en-US"/>
               <a:t>Click to edit Master title style</a:t>
             </a:r>
             <a:endParaRPr lang="en-CA"/>
@@ -358,35 +366,35 @@
           <a:p>
             <a:pPr lvl="0"/>
             <a:r>
-              <a:rPr lang="en-US" smtClean="0"/>
+              <a:rPr lang="en-US"/>
               <a:t>Click to edit Master text styles</a:t>
             </a:r>
           </a:p>
           <a:p>
             <a:pPr lvl="1"/>
             <a:r>
-              <a:rPr lang="en-US" smtClean="0"/>
+              <a:rPr lang="en-US"/>
               <a:t>Second level</a:t>
             </a:r>
           </a:p>
           <a:p>
             <a:pPr lvl="2"/>
             <a:r>
-              <a:rPr lang="en-US" smtClean="0"/>
+              <a:rPr lang="en-US"/>
               <a:t>Third level</a:t>
             </a:r>
           </a:p>
           <a:p>
             <a:pPr lvl="3"/>
             <a:r>
-              <a:rPr lang="en-US" smtClean="0"/>
+              <a:rPr lang="en-US"/>
               <a:t>Fourth level</a:t>
             </a:r>
           </a:p>
           <a:p>
             <a:pPr lvl="4"/>
             <a:r>
-              <a:rPr lang="en-US" smtClean="0"/>
+              <a:rPr lang="en-US"/>
               <a:t>Fifth level</a:t>
             </a:r>
             <a:endParaRPr lang="en-CA"/>
@@ -410,7 +418,7 @@
           <a:p>
             <a:fld id="{C81834C4-83DE-442D-8864-6FB21BA191F9}" type="datetimeFigureOut">
               <a:rPr lang="en-CA" smtClean="0"/>
-              <a:t>2023-05-12</a:t>
+              <a:t>2023-06-21</a:t>
             </a:fld>
             <a:endParaRPr lang="en-CA"/>
           </a:p>
@@ -509,7 +517,7 @@
           <a:lstStyle/>
           <a:p>
             <a:r>
-              <a:rPr lang="en-US" smtClean="0"/>
+              <a:rPr lang="en-US"/>
               <a:t>Click to edit Master title style</a:t>
             </a:r>
             <a:endParaRPr lang="en-CA"/>
@@ -538,35 +546,35 @@
           <a:p>
             <a:pPr lvl="0"/>
             <a:r>
-              <a:rPr lang="en-US" smtClean="0"/>
+              <a:rPr lang="en-US"/>
               <a:t>Click to edit Master text styles</a:t>
             </a:r>
           </a:p>
           <a:p>
             <a:pPr lvl="1"/>
             <a:r>
-              <a:rPr lang="en-US" smtClean="0"/>
+              <a:rPr lang="en-US"/>
               <a:t>Second level</a:t>
             </a:r>
           </a:p>
           <a:p>
             <a:pPr lvl="2"/>
             <a:r>
-              <a:rPr lang="en-US" smtClean="0"/>
+              <a:rPr lang="en-US"/>
               <a:t>Third level</a:t>
             </a:r>
           </a:p>
           <a:p>
             <a:pPr lvl="3"/>
             <a:r>
-              <a:rPr lang="en-US" smtClean="0"/>
+              <a:rPr lang="en-US"/>
               <a:t>Fourth level</a:t>
             </a:r>
           </a:p>
           <a:p>
             <a:pPr lvl="4"/>
             <a:r>
-              <a:rPr lang="en-US" smtClean="0"/>
+              <a:rPr lang="en-US"/>
               <a:t>Fifth level</a:t>
             </a:r>
             <a:endParaRPr lang="en-CA"/>
@@ -590,7 +598,7 @@
           <a:p>
             <a:fld id="{C81834C4-83DE-442D-8864-6FB21BA191F9}" type="datetimeFigureOut">
               <a:rPr lang="en-CA" smtClean="0"/>
-              <a:t>2023-05-12</a:t>
+              <a:t>2023-06-21</a:t>
             </a:fld>
             <a:endParaRPr lang="en-CA"/>
           </a:p>
@@ -684,7 +692,7 @@
           <a:lstStyle/>
           <a:p>
             <a:r>
-              <a:rPr lang="en-US" smtClean="0"/>
+              <a:rPr lang="en-US"/>
               <a:t>Click to edit Master title style</a:t>
             </a:r>
             <a:endParaRPr lang="en-CA"/>
@@ -708,35 +716,35 @@
           <a:p>
             <a:pPr lvl="0"/>
             <a:r>
-              <a:rPr lang="en-US" smtClean="0"/>
+              <a:rPr lang="en-US"/>
               <a:t>Click to edit Master text styles</a:t>
             </a:r>
           </a:p>
           <a:p>
             <a:pPr lvl="1"/>
             <a:r>
-              <a:rPr lang="en-US" smtClean="0"/>
+              <a:rPr lang="en-US"/>
               <a:t>Second level</a:t>
             </a:r>
           </a:p>
           <a:p>
             <a:pPr lvl="2"/>
             <a:r>
-              <a:rPr lang="en-US" smtClean="0"/>
+              <a:rPr lang="en-US"/>
               <a:t>Third level</a:t>
             </a:r>
           </a:p>
           <a:p>
             <a:pPr lvl="3"/>
             <a:r>
-              <a:rPr lang="en-US" smtClean="0"/>
+              <a:rPr lang="en-US"/>
               <a:t>Fourth level</a:t>
             </a:r>
           </a:p>
           <a:p>
             <a:pPr lvl="4"/>
             <a:r>
-              <a:rPr lang="en-US" smtClean="0"/>
+              <a:rPr lang="en-US"/>
               <a:t>Fifth level</a:t>
             </a:r>
             <a:endParaRPr lang="en-CA"/>
@@ -760,7 +768,7 @@
           <a:p>
             <a:fld id="{C81834C4-83DE-442D-8864-6FB21BA191F9}" type="datetimeFigureOut">
               <a:rPr lang="en-CA" smtClean="0"/>
-              <a:t>2023-05-12</a:t>
+              <a:t>2023-06-21</a:t>
             </a:fld>
             <a:endParaRPr lang="en-CA"/>
           </a:p>
@@ -863,7 +871,7 @@
           </a:lstStyle>
           <a:p>
             <a:r>
-              <a:rPr lang="en-US" smtClean="0"/>
+              <a:rPr lang="en-US"/>
               <a:t>Click to edit Master title style</a:t>
             </a:r>
             <a:endParaRPr lang="en-CA"/>
@@ -983,7 +991,7 @@
           <a:p>
             <a:pPr lvl="0"/>
             <a:r>
-              <a:rPr lang="en-US" smtClean="0"/>
+              <a:rPr lang="en-US"/>
               <a:t>Click to edit Master text styles</a:t>
             </a:r>
           </a:p>
@@ -1006,7 +1014,7 @@
           <a:p>
             <a:fld id="{C81834C4-83DE-442D-8864-6FB21BA191F9}" type="datetimeFigureOut">
               <a:rPr lang="en-CA" smtClean="0"/>
-              <a:t>2023-05-12</a:t>
+              <a:t>2023-06-21</a:t>
             </a:fld>
             <a:endParaRPr lang="en-CA"/>
           </a:p>
@@ -1100,7 +1108,7 @@
           <a:lstStyle/>
           <a:p>
             <a:r>
-              <a:rPr lang="en-US" smtClean="0"/>
+              <a:rPr lang="en-US"/>
               <a:t>Click to edit Master title style</a:t>
             </a:r>
             <a:endParaRPr lang="en-CA"/>
@@ -1129,35 +1137,35 @@
           <a:p>
             <a:pPr lvl="0"/>
             <a:r>
-              <a:rPr lang="en-US" smtClean="0"/>
+              <a:rPr lang="en-US"/>
               <a:t>Click to edit Master text styles</a:t>
             </a:r>
           </a:p>
           <a:p>
             <a:pPr lvl="1"/>
             <a:r>
-              <a:rPr lang="en-US" smtClean="0"/>
+              <a:rPr lang="en-US"/>
               <a:t>Second level</a:t>
             </a:r>
           </a:p>
           <a:p>
             <a:pPr lvl="2"/>
             <a:r>
-              <a:rPr lang="en-US" smtClean="0"/>
+              <a:rPr lang="en-US"/>
               <a:t>Third level</a:t>
             </a:r>
           </a:p>
           <a:p>
             <a:pPr lvl="3"/>
             <a:r>
-              <a:rPr lang="en-US" smtClean="0"/>
+              <a:rPr lang="en-US"/>
               <a:t>Fourth level</a:t>
             </a:r>
           </a:p>
           <a:p>
             <a:pPr lvl="4"/>
             <a:r>
-              <a:rPr lang="en-US" smtClean="0"/>
+              <a:rPr lang="en-US"/>
               <a:t>Fifth level</a:t>
             </a:r>
             <a:endParaRPr lang="en-CA"/>
@@ -1186,35 +1194,35 @@
           <a:p>
             <a:pPr lvl="0"/>
             <a:r>
-              <a:rPr lang="en-US" smtClean="0"/>
+              <a:rPr lang="en-US"/>
               <a:t>Click to edit Master text styles</a:t>
             </a:r>
           </a:p>
           <a:p>
             <a:pPr lvl="1"/>
             <a:r>
-              <a:rPr lang="en-US" smtClean="0"/>
+              <a:rPr lang="en-US"/>
               <a:t>Second level</a:t>
             </a:r>
           </a:p>
           <a:p>
             <a:pPr lvl="2"/>
             <a:r>
-              <a:rPr lang="en-US" smtClean="0"/>
+              <a:rPr lang="en-US"/>
               <a:t>Third level</a:t>
             </a:r>
           </a:p>
           <a:p>
             <a:pPr lvl="3"/>
             <a:r>
-              <a:rPr lang="en-US" smtClean="0"/>
+              <a:rPr lang="en-US"/>
               <a:t>Fourth level</a:t>
             </a:r>
           </a:p>
           <a:p>
             <a:pPr lvl="4"/>
             <a:r>
-              <a:rPr lang="en-US" smtClean="0"/>
+              <a:rPr lang="en-US"/>
               <a:t>Fifth level</a:t>
             </a:r>
             <a:endParaRPr lang="en-CA"/>
@@ -1238,7 +1246,7 @@
           <a:p>
             <a:fld id="{C81834C4-83DE-442D-8864-6FB21BA191F9}" type="datetimeFigureOut">
               <a:rPr lang="en-CA" smtClean="0"/>
-              <a:t>2023-05-12</a:t>
+              <a:t>2023-06-21</a:t>
             </a:fld>
             <a:endParaRPr lang="en-CA"/>
           </a:p>
@@ -1337,7 +1345,7 @@
           <a:lstStyle/>
           <a:p>
             <a:r>
-              <a:rPr lang="en-US" smtClean="0"/>
+              <a:rPr lang="en-US"/>
               <a:t>Click to edit Master title style</a:t>
             </a:r>
             <a:endParaRPr lang="en-CA"/>
@@ -1403,7 +1411,7 @@
           <a:p>
             <a:pPr lvl="0"/>
             <a:r>
-              <a:rPr lang="en-US" smtClean="0"/>
+              <a:rPr lang="en-US"/>
               <a:t>Click to edit Master text styles</a:t>
             </a:r>
           </a:p>
@@ -1431,35 +1439,35 @@
           <a:p>
             <a:pPr lvl="0"/>
             <a:r>
-              <a:rPr lang="en-US" smtClean="0"/>
+              <a:rPr lang="en-US"/>
               <a:t>Click to edit Master text styles</a:t>
             </a:r>
           </a:p>
           <a:p>
             <a:pPr lvl="1"/>
             <a:r>
-              <a:rPr lang="en-US" smtClean="0"/>
+              <a:rPr lang="en-US"/>
               <a:t>Second level</a:t>
             </a:r>
           </a:p>
           <a:p>
             <a:pPr lvl="2"/>
             <a:r>
-              <a:rPr lang="en-US" smtClean="0"/>
+              <a:rPr lang="en-US"/>
               <a:t>Third level</a:t>
             </a:r>
           </a:p>
           <a:p>
             <a:pPr lvl="3"/>
             <a:r>
-              <a:rPr lang="en-US" smtClean="0"/>
+              <a:rPr lang="en-US"/>
               <a:t>Fourth level</a:t>
             </a:r>
           </a:p>
           <a:p>
             <a:pPr lvl="4"/>
             <a:r>
-              <a:rPr lang="en-US" smtClean="0"/>
+              <a:rPr lang="en-US"/>
               <a:t>Fifth level</a:t>
             </a:r>
             <a:endParaRPr lang="en-CA"/>
@@ -1525,7 +1533,7 @@
           <a:p>
             <a:pPr lvl="0"/>
             <a:r>
-              <a:rPr lang="en-US" smtClean="0"/>
+              <a:rPr lang="en-US"/>
               <a:t>Click to edit Master text styles</a:t>
             </a:r>
           </a:p>
@@ -1553,35 +1561,35 @@
           <a:p>
             <a:pPr lvl="0"/>
             <a:r>
-              <a:rPr lang="en-US" smtClean="0"/>
+              <a:rPr lang="en-US"/>
               <a:t>Click to edit Master text styles</a:t>
             </a:r>
           </a:p>
           <a:p>
             <a:pPr lvl="1"/>
             <a:r>
-              <a:rPr lang="en-US" smtClean="0"/>
+              <a:rPr lang="en-US"/>
               <a:t>Second level</a:t>
             </a:r>
           </a:p>
           <a:p>
             <a:pPr lvl="2"/>
             <a:r>
-              <a:rPr lang="en-US" smtClean="0"/>
+              <a:rPr lang="en-US"/>
               <a:t>Third level</a:t>
             </a:r>
           </a:p>
           <a:p>
             <a:pPr lvl="3"/>
             <a:r>
-              <a:rPr lang="en-US" smtClean="0"/>
+              <a:rPr lang="en-US"/>
               <a:t>Fourth level</a:t>
             </a:r>
           </a:p>
           <a:p>
             <a:pPr lvl="4"/>
             <a:r>
-              <a:rPr lang="en-US" smtClean="0"/>
+              <a:rPr lang="en-US"/>
               <a:t>Fifth level</a:t>
             </a:r>
             <a:endParaRPr lang="en-CA"/>
@@ -1605,7 +1613,7 @@
           <a:p>
             <a:fld id="{C81834C4-83DE-442D-8864-6FB21BA191F9}" type="datetimeFigureOut">
               <a:rPr lang="en-CA" smtClean="0"/>
-              <a:t>2023-05-12</a:t>
+              <a:t>2023-06-21</a:t>
             </a:fld>
             <a:endParaRPr lang="en-CA"/>
           </a:p>
@@ -1699,7 +1707,7 @@
           <a:lstStyle/>
           <a:p>
             <a:r>
-              <a:rPr lang="en-US" smtClean="0"/>
+              <a:rPr lang="en-US"/>
               <a:t>Click to edit Master title style</a:t>
             </a:r>
             <a:endParaRPr lang="en-CA"/>
@@ -1723,7 +1731,7 @@
           <a:p>
             <a:fld id="{C81834C4-83DE-442D-8864-6FB21BA191F9}" type="datetimeFigureOut">
               <a:rPr lang="en-CA" smtClean="0"/>
-              <a:t>2023-05-12</a:t>
+              <a:t>2023-06-21</a:t>
             </a:fld>
             <a:endParaRPr lang="en-CA"/>
           </a:p>
@@ -1818,7 +1826,7 @@
           <a:p>
             <a:fld id="{C81834C4-83DE-442D-8864-6FB21BA191F9}" type="datetimeFigureOut">
               <a:rPr lang="en-CA" smtClean="0"/>
-              <a:t>2023-05-12</a:t>
+              <a:t>2023-06-21</a:t>
             </a:fld>
             <a:endParaRPr lang="en-CA"/>
           </a:p>
@@ -1921,7 +1929,7 @@
           </a:lstStyle>
           <a:p>
             <a:r>
-              <a:rPr lang="en-US" smtClean="0"/>
+              <a:rPr lang="en-US"/>
               <a:t>Click to edit Master title style</a:t>
             </a:r>
             <a:endParaRPr lang="en-CA"/>
@@ -1978,35 +1986,35 @@
           <a:p>
             <a:pPr lvl="0"/>
             <a:r>
-              <a:rPr lang="en-US" smtClean="0"/>
+              <a:rPr lang="en-US"/>
               <a:t>Click to edit Master text styles</a:t>
             </a:r>
           </a:p>
           <a:p>
             <a:pPr lvl="1"/>
             <a:r>
-              <a:rPr lang="en-US" smtClean="0"/>
+              <a:rPr lang="en-US"/>
               <a:t>Second level</a:t>
             </a:r>
           </a:p>
           <a:p>
             <a:pPr lvl="2"/>
             <a:r>
-              <a:rPr lang="en-US" smtClean="0"/>
+              <a:rPr lang="en-US"/>
               <a:t>Third level</a:t>
             </a:r>
           </a:p>
           <a:p>
             <a:pPr lvl="3"/>
             <a:r>
-              <a:rPr lang="en-US" smtClean="0"/>
+              <a:rPr lang="en-US"/>
               <a:t>Fourth level</a:t>
             </a:r>
           </a:p>
           <a:p>
             <a:pPr lvl="4"/>
             <a:r>
-              <a:rPr lang="en-US" smtClean="0"/>
+              <a:rPr lang="en-US"/>
               <a:t>Fifth level</a:t>
             </a:r>
             <a:endParaRPr lang="en-CA"/>
@@ -2072,7 +2080,7 @@
           <a:p>
             <a:pPr lvl="0"/>
             <a:r>
-              <a:rPr lang="en-US" smtClean="0"/>
+              <a:rPr lang="en-US"/>
               <a:t>Click to edit Master text styles</a:t>
             </a:r>
           </a:p>
@@ -2095,7 +2103,7 @@
           <a:p>
             <a:fld id="{C81834C4-83DE-442D-8864-6FB21BA191F9}" type="datetimeFigureOut">
               <a:rPr lang="en-CA" smtClean="0"/>
-              <a:t>2023-05-12</a:t>
+              <a:t>2023-06-21</a:t>
             </a:fld>
             <a:endParaRPr lang="en-CA"/>
           </a:p>
@@ -2198,7 +2206,7 @@
           </a:lstStyle>
           <a:p>
             <a:r>
-              <a:rPr lang="en-US" smtClean="0"/>
+              <a:rPr lang="en-US"/>
               <a:t>Click to edit Master title style</a:t>
             </a:r>
             <a:endParaRPr lang="en-CA"/>
@@ -2325,7 +2333,7 @@
           <a:p>
             <a:pPr lvl="0"/>
             <a:r>
-              <a:rPr lang="en-US" smtClean="0"/>
+              <a:rPr lang="en-US"/>
               <a:t>Click to edit Master text styles</a:t>
             </a:r>
           </a:p>
@@ -2348,7 +2356,7 @@
           <a:p>
             <a:fld id="{C81834C4-83DE-442D-8864-6FB21BA191F9}" type="datetimeFigureOut">
               <a:rPr lang="en-CA" smtClean="0"/>
-              <a:t>2023-05-12</a:t>
+              <a:t>2023-06-21</a:t>
             </a:fld>
             <a:endParaRPr lang="en-CA"/>
           </a:p>
@@ -2457,7 +2465,7 @@
           <a:lstStyle/>
           <a:p>
             <a:r>
-              <a:rPr lang="en-US" smtClean="0"/>
+              <a:rPr lang="en-US"/>
               <a:t>Click to edit Master title style</a:t>
             </a:r>
             <a:endParaRPr lang="en-CA"/>
@@ -2491,35 +2499,35 @@
           <a:p>
             <a:pPr lvl="0"/>
             <a:r>
-              <a:rPr lang="en-US" smtClean="0"/>
+              <a:rPr lang="en-US"/>
               <a:t>Click to edit Master text styles</a:t>
             </a:r>
           </a:p>
           <a:p>
             <a:pPr lvl="1"/>
             <a:r>
-              <a:rPr lang="en-US" smtClean="0"/>
+              <a:rPr lang="en-US"/>
               <a:t>Second level</a:t>
             </a:r>
           </a:p>
           <a:p>
             <a:pPr lvl="2"/>
             <a:r>
-              <a:rPr lang="en-US" smtClean="0"/>
+              <a:rPr lang="en-US"/>
               <a:t>Third level</a:t>
             </a:r>
           </a:p>
           <a:p>
             <a:pPr lvl="3"/>
             <a:r>
-              <a:rPr lang="en-US" smtClean="0"/>
+              <a:rPr lang="en-US"/>
               <a:t>Fourth level</a:t>
             </a:r>
           </a:p>
           <a:p>
             <a:pPr lvl="4"/>
             <a:r>
-              <a:rPr lang="en-US" smtClean="0"/>
+              <a:rPr lang="en-US"/>
               <a:t>Fifth level</a:t>
             </a:r>
             <a:endParaRPr lang="en-CA"/>
@@ -2561,7 +2569,7 @@
           <a:p>
             <a:fld id="{C81834C4-83DE-442D-8864-6FB21BA191F9}" type="datetimeFigureOut">
               <a:rPr lang="en-CA" smtClean="0"/>
-              <a:t>2023-05-12</a:t>
+              <a:t>2023-06-21</a:t>
             </a:fld>
             <a:endParaRPr lang="en-CA"/>
           </a:p>
@@ -3037,38 +3045,38 @@
           <a:lstStyle/>
           <a:p>
             <a:r>
-              <a:rPr lang="en-CA" dirty="0" smtClean="0"/>
+              <a:rPr lang="en-CA" dirty="0"/>
               <a:t>Top sig</a:t>
             </a:r>
           </a:p>
           <a:p>
             <a:r>
-              <a:rPr lang="en-CA" dirty="0" smtClean="0"/>
+              <a:rPr lang="en-CA" dirty="0"/>
               <a:t>GND</a:t>
             </a:r>
           </a:p>
           <a:p>
             <a:r>
-              <a:rPr lang="en-CA" dirty="0" smtClean="0"/>
+              <a:rPr lang="en-CA" dirty="0"/>
               <a:t>Horizontal Sig</a:t>
             </a:r>
           </a:p>
           <a:p>
             <a:r>
-              <a:rPr lang="en-CA" dirty="0" smtClean="0"/>
+              <a:rPr lang="en-CA" dirty="0"/>
               <a:t>Vertical Sig</a:t>
             </a:r>
             <a:br>
-              <a:rPr lang="en-CA" dirty="0" smtClean="0"/>
+              <a:rPr lang="en-CA" dirty="0"/>
             </a:br>
             <a:r>
-              <a:rPr lang="en-CA" dirty="0" smtClean="0"/>
+              <a:rPr lang="en-CA" dirty="0"/>
               <a:t>PWR</a:t>
             </a:r>
           </a:p>
           <a:p>
             <a:r>
-              <a:rPr lang="en-CA" dirty="0" smtClean="0"/>
+              <a:rPr lang="en-CA" dirty="0"/>
               <a:t>Bot sig</a:t>
             </a:r>
           </a:p>
@@ -3192,6 +3200,186 @@
     <p:extLst>
       <p:ext uri="{BB962C8B-B14F-4D97-AF65-F5344CB8AC3E}">
         <p14:creationId xmlns:p14="http://schemas.microsoft.com/office/powerpoint/2010/main" val="2907659503"/>
+      </p:ext>
+    </p:extLst>
+  </p:cSld>
+  <p:clrMapOvr>
+    <a:masterClrMapping/>
+  </p:clrMapOvr>
+</p:sld>
+</file>
+
+<file path=ppt/slides/slide4.xml><?xml version="1.0" encoding="utf-8"?>
+<p:sld xmlns:a="http://schemas.openxmlformats.org/drawingml/2006/main" xmlns:r="http://schemas.openxmlformats.org/officeDocument/2006/relationships" xmlns:p="http://schemas.openxmlformats.org/presentationml/2006/main">
+  <p:cSld>
+    <p:spTree>
+      <p:nvGrpSpPr>
+        <p:cNvPr id="1" name=""/>
+        <p:cNvGrpSpPr/>
+        <p:nvPr/>
+      </p:nvGrpSpPr>
+      <p:grpSpPr>
+        <a:xfrm>
+          <a:off x="0" y="0"/>
+          <a:ext cx="0" cy="0"/>
+          <a:chOff x="0" y="0"/>
+          <a:chExt cx="0" cy="0"/>
+        </a:xfrm>
+      </p:grpSpPr>
+      <p:pic>
+        <p:nvPicPr>
+          <p:cNvPr id="4" name="Picture 3">
+            <a:extLst>
+              <a:ext uri="{FF2B5EF4-FFF2-40B4-BE49-F238E27FC236}">
+                <a16:creationId xmlns:a16="http://schemas.microsoft.com/office/drawing/2014/main" id="{9B2289AB-61D6-38C3-F6E9-80DBD6B8B338}"/>
+              </a:ext>
+            </a:extLst>
+          </p:cNvPr>
+          <p:cNvPicPr>
+            <a:picLocks noChangeAspect="1"/>
+          </p:cNvPicPr>
+          <p:nvPr/>
+        </p:nvPicPr>
+        <p:blipFill>
+          <a:blip r:embed="rId2"/>
+          <a:stretch>
+            <a:fillRect/>
+          </a:stretch>
+        </p:blipFill>
+        <p:spPr>
+          <a:xfrm>
+            <a:off x="2085415" y="847364"/>
+            <a:ext cx="8021169" cy="5163271"/>
+          </a:xfrm>
+          <a:prstGeom prst="rect">
+            <a:avLst/>
+          </a:prstGeom>
+        </p:spPr>
+      </p:pic>
+    </p:spTree>
+    <p:extLst>
+      <p:ext uri="{BB962C8B-B14F-4D97-AF65-F5344CB8AC3E}">
+        <p14:creationId xmlns:p14="http://schemas.microsoft.com/office/powerpoint/2010/main" val="189010748"/>
+      </p:ext>
+    </p:extLst>
+  </p:cSld>
+  <p:clrMapOvr>
+    <a:masterClrMapping/>
+  </p:clrMapOvr>
+</p:sld>
+</file>
+
+<file path=ppt/slides/slide5.xml><?xml version="1.0" encoding="utf-8"?>
+<p:sld xmlns:a="http://schemas.openxmlformats.org/drawingml/2006/main" xmlns:r="http://schemas.openxmlformats.org/officeDocument/2006/relationships" xmlns:p="http://schemas.openxmlformats.org/presentationml/2006/main">
+  <p:cSld>
+    <p:spTree>
+      <p:nvGrpSpPr>
+        <p:cNvPr id="1" name=""/>
+        <p:cNvGrpSpPr/>
+        <p:nvPr/>
+      </p:nvGrpSpPr>
+      <p:grpSpPr>
+        <a:xfrm>
+          <a:off x="0" y="0"/>
+          <a:ext cx="0" cy="0"/>
+          <a:chOff x="0" y="0"/>
+          <a:chExt cx="0" cy="0"/>
+        </a:xfrm>
+      </p:grpSpPr>
+      <p:pic>
+        <p:nvPicPr>
+          <p:cNvPr id="3" name="Picture 2">
+            <a:extLst>
+              <a:ext uri="{FF2B5EF4-FFF2-40B4-BE49-F238E27FC236}">
+                <a16:creationId xmlns:a16="http://schemas.microsoft.com/office/drawing/2014/main" id="{0028AACC-D486-61F5-18BC-CC77A0A7DF70}"/>
+              </a:ext>
+            </a:extLst>
+          </p:cNvPr>
+          <p:cNvPicPr>
+            <a:picLocks noChangeAspect="1"/>
+          </p:cNvPicPr>
+          <p:nvPr/>
+        </p:nvPicPr>
+        <p:blipFill>
+          <a:blip r:embed="rId2"/>
+          <a:stretch>
+            <a:fillRect/>
+          </a:stretch>
+        </p:blipFill>
+        <p:spPr>
+          <a:xfrm>
+            <a:off x="2133047" y="1623760"/>
+            <a:ext cx="7925906" cy="3610479"/>
+          </a:xfrm>
+          <a:prstGeom prst="rect">
+            <a:avLst/>
+          </a:prstGeom>
+        </p:spPr>
+      </p:pic>
+    </p:spTree>
+    <p:extLst>
+      <p:ext uri="{BB962C8B-B14F-4D97-AF65-F5344CB8AC3E}">
+        <p14:creationId xmlns:p14="http://schemas.microsoft.com/office/powerpoint/2010/main" val="2502708193"/>
+      </p:ext>
+    </p:extLst>
+  </p:cSld>
+  <p:clrMapOvr>
+    <a:masterClrMapping/>
+  </p:clrMapOvr>
+</p:sld>
+</file>
+
+<file path=ppt/slides/slide6.xml><?xml version="1.0" encoding="utf-8"?>
+<p:sld xmlns:a="http://schemas.openxmlformats.org/drawingml/2006/main" xmlns:r="http://schemas.openxmlformats.org/officeDocument/2006/relationships" xmlns:p="http://schemas.openxmlformats.org/presentationml/2006/main">
+  <p:cSld>
+    <p:spTree>
+      <p:nvGrpSpPr>
+        <p:cNvPr id="1" name=""/>
+        <p:cNvGrpSpPr/>
+        <p:nvPr/>
+      </p:nvGrpSpPr>
+      <p:grpSpPr>
+        <a:xfrm>
+          <a:off x="0" y="0"/>
+          <a:ext cx="0" cy="0"/>
+          <a:chOff x="0" y="0"/>
+          <a:chExt cx="0" cy="0"/>
+        </a:xfrm>
+      </p:grpSpPr>
+      <p:pic>
+        <p:nvPicPr>
+          <p:cNvPr id="4" name="Picture 3">
+            <a:extLst>
+              <a:ext uri="{FF2B5EF4-FFF2-40B4-BE49-F238E27FC236}">
+                <a16:creationId xmlns:a16="http://schemas.microsoft.com/office/drawing/2014/main" id="{2C034938-9357-B0CF-AF18-6D334F0878A7}"/>
+              </a:ext>
+            </a:extLst>
+          </p:cNvPr>
+          <p:cNvPicPr>
+            <a:picLocks noChangeAspect="1"/>
+          </p:cNvPicPr>
+          <p:nvPr/>
+        </p:nvPicPr>
+        <p:blipFill>
+          <a:blip r:embed="rId2"/>
+          <a:stretch>
+            <a:fillRect/>
+          </a:stretch>
+        </p:blipFill>
+        <p:spPr>
+          <a:xfrm>
+            <a:off x="2495255" y="175758"/>
+            <a:ext cx="6801799" cy="6506483"/>
+          </a:xfrm>
+          <a:prstGeom prst="rect">
+            <a:avLst/>
+          </a:prstGeom>
+        </p:spPr>
+      </p:pic>
+    </p:spTree>
+    <p:extLst>
+      <p:ext uri="{BB962C8B-B14F-4D97-AF65-F5344CB8AC3E}">
+        <p14:creationId xmlns:p14="http://schemas.microsoft.com/office/powerpoint/2010/main" val="3474853074"/>
       </p:ext>
     </p:extLst>
   </p:cSld>

</xml_diff>